<commit_message>
Completed method to fill the title page with the relevant information and fill every other slide with the header and bulletpoints. Speakers note and images have yet to be added
</commit_message>
<xml_diff>
--- a/new_template.pptx
+++ b/new_template.pptx
@@ -3207,7 +3207,7 @@
                 </a:solidFill>
                 <a:latin typeface="Inter Bold"/>
               </a:rPr>
-              <a:t>A course that goes into the history of Porsche and how it was founded</a:t>
+              <a:t>beta 1.0</a:t>
             </a:r>
           </a:p>
         </p:txBody>
@@ -3220,8 +3220,8 @@
         </p:nvSpPr>
         <p:spPr>
           <a:xfrm rot="0">
-            <a:off x="850974" y="2332416"/>
-            <a:ext cx="16408332" cy="2084083"/>
+            <a:off x="850974" y="3128592"/>
+            <a:ext cx="16408332" cy="1287908"/>
           </a:xfrm>
           <a:prstGeom prst="rect">
             <a:avLst/>
@@ -3235,17 +3235,17 @@
           <a:p>
             <a:pPr algn="l">
               <a:lnSpc>
-                <a:spcPts val="15250"/>
+                <a:spcPts val="9464"/>
               </a:lnSpc>
             </a:pPr>
             <a:r>
-              <a:rPr lang="en-US" sz="16758" spc="83">
+              <a:rPr sz="10400">
                 <a:solidFill>
                   <a:srgbClr val="2B2C30"/>
                 </a:solidFill>
                 <a:latin typeface="Playfair Display"/>
               </a:rPr>
-              <a:t>Pitch Deck</a:t>
+              <a:t>The History of Domestication</a:t>
             </a:r>
           </a:p>
         </p:txBody>
@@ -3363,13 +3363,13 @@
               </a:lnSpc>
             </a:pPr>
             <a:r>
-              <a:rPr lang="en-US" sz="6399" spc="31">
+              <a:rPr sz="6399">
                 <a:solidFill>
                   <a:srgbClr val="2B2C30"/>
                 </a:solidFill>
                 <a:latin typeface="Playfair Display"/>
               </a:rPr>
-              <a:t>Title 1</a:t>
+              <a:t>Introduction to Domestication</a:t>
             </a:r>
           </a:p>
         </p:txBody>
@@ -3404,13 +3404,29 @@
               </a:spcBef>
             </a:pPr>
             <a:r>
-              <a:rPr lang="en-US" sz="3600">
+              <a:t/>
+            </a:r>
+          </a:p>
+          <a:p>
+            <a:r>
+              <a:rPr sz="3600">
                 <a:solidFill>
                   <a:srgbClr val="2B2C30"/>
                 </a:solidFill>
                 <a:latin typeface="Inter"/>
               </a:rPr>
-              <a:t>Hello</a:t>
+              <a:t>1. Definition of domestication</a:t>
+            </a:r>
+          </a:p>
+          <a:p>
+            <a:r>
+              <a:rPr sz="3600">
+                <a:solidFill>
+                  <a:srgbClr val="2B2C30"/>
+                </a:solidFill>
+                <a:latin typeface="Inter"/>
+              </a:rPr>
+              <a:t>2. Brief overview of its historical significance</a:t>
             </a:r>
           </a:p>
         </p:txBody>
@@ -3474,13 +3490,13 @@
               </a:lnSpc>
             </a:pPr>
             <a:r>
-              <a:rPr lang="en-US" sz="6399" spc="31">
+              <a:rPr sz="6399">
                 <a:solidFill>
                   <a:srgbClr val="2B2C30"/>
                 </a:solidFill>
                 <a:latin typeface="Playfair Display"/>
               </a:rPr>
-              <a:t>Title 2</a:t>
+              <a:t>Early Domestication</a:t>
             </a:r>
           </a:p>
         </p:txBody>
@@ -3515,13 +3531,40 @@
               </a:spcBef>
             </a:pPr>
             <a:r>
-              <a:rPr lang="en-US" sz="3600">
+              <a:t/>
+            </a:r>
+          </a:p>
+          <a:p>
+            <a:r>
+              <a:rPr sz="3600">
                 <a:solidFill>
                   <a:srgbClr val="2B2C30"/>
                 </a:solidFill>
                 <a:latin typeface="Inter"/>
               </a:rPr>
-              <a:t>Hello</a:t>
+              <a:t>1. Beginning in the Neolithic Era</a:t>
+            </a:r>
+          </a:p>
+          <a:p>
+            <a:r>
+              <a:rPr sz="3600">
+                <a:solidFill>
+                  <a:srgbClr val="2B2C30"/>
+                </a:solidFill>
+                <a:latin typeface="Inter"/>
+              </a:rPr>
+              <a:t>2. Early domesticated animals: dogs, cattle, and goats</a:t>
+            </a:r>
+          </a:p>
+          <a:p>
+            <a:r>
+              <a:rPr sz="3600">
+                <a:solidFill>
+                  <a:srgbClr val="2B2C30"/>
+                </a:solidFill>
+                <a:latin typeface="Inter"/>
+              </a:rPr>
+              <a:t>3. Domestication of plants: wheat, rice, and corn</a:t>
             </a:r>
           </a:p>
         </p:txBody>
@@ -3585,13 +3628,13 @@
               </a:lnSpc>
             </a:pPr>
             <a:r>
-              <a:rPr lang="en-US" sz="6399" spc="31">
+              <a:rPr sz="6399">
                 <a:solidFill>
                   <a:srgbClr val="2B2C30"/>
                 </a:solidFill>
                 <a:latin typeface="Playfair Display"/>
               </a:rPr>
-              <a:t>Title 3</a:t>
+              <a:t>Impacts of Domestication</a:t>
             </a:r>
           </a:p>
         </p:txBody>
@@ -3626,13 +3669,40 @@
               </a:spcBef>
             </a:pPr>
             <a:r>
-              <a:rPr lang="en-US" sz="3600">
+              <a:t/>
+            </a:r>
+          </a:p>
+          <a:p>
+            <a:r>
+              <a:rPr sz="3600">
                 <a:solidFill>
                   <a:srgbClr val="2B2C30"/>
                 </a:solidFill>
                 <a:latin typeface="Inter"/>
               </a:rPr>
-              <a:t>Hello</a:t>
+              <a:t>1. Agricultural development</a:t>
+            </a:r>
+          </a:p>
+          <a:p>
+            <a:r>
+              <a:rPr sz="3600">
+                <a:solidFill>
+                  <a:srgbClr val="2B2C30"/>
+                </a:solidFill>
+                <a:latin typeface="Inter"/>
+              </a:rPr>
+              <a:t>2. Growth of civilizations</a:t>
+            </a:r>
+          </a:p>
+          <a:p>
+            <a:r>
+              <a:rPr sz="3600">
+                <a:solidFill>
+                  <a:srgbClr val="2B2C30"/>
+                </a:solidFill>
+                <a:latin typeface="Inter"/>
+              </a:rPr>
+              <a:t>3. Environmental changes</a:t>
             </a:r>
           </a:p>
         </p:txBody>
@@ -3696,13 +3766,13 @@
               </a:lnSpc>
             </a:pPr>
             <a:r>
-              <a:rPr lang="en-US" sz="6399" spc="31">
+              <a:rPr sz="6399">
                 <a:solidFill>
                   <a:srgbClr val="2B2C30"/>
                 </a:solidFill>
                 <a:latin typeface="Playfair Display"/>
               </a:rPr>
-              <a:t>Title 4</a:t>
+              <a:t>Modern Implications</a:t>
             </a:r>
           </a:p>
         </p:txBody>
@@ -3737,13 +3807,40 @@
               </a:spcBef>
             </a:pPr>
             <a:r>
-              <a:rPr lang="en-US" sz="3600">
+              <a:t/>
+            </a:r>
+          </a:p>
+          <a:p>
+            <a:r>
+              <a:rPr sz="3600">
                 <a:solidFill>
                   <a:srgbClr val="2B2C30"/>
                 </a:solidFill>
                 <a:latin typeface="Inter"/>
               </a:rPr>
-              <a:t>Hello</a:t>
+              <a:t>1. Genetic modification and selective breeding</a:t>
+            </a:r>
+          </a:p>
+          <a:p>
+            <a:r>
+              <a:rPr sz="3600">
+                <a:solidFill>
+                  <a:srgbClr val="2B2C30"/>
+                </a:solidFill>
+                <a:latin typeface="Inter"/>
+              </a:rPr>
+              <a:t>2. Conservation and biodiversity issues</a:t>
+            </a:r>
+          </a:p>
+          <a:p>
+            <a:r>
+              <a:rPr sz="3600">
+                <a:solidFill>
+                  <a:srgbClr val="2B2C30"/>
+                </a:solidFill>
+                <a:latin typeface="Inter"/>
+              </a:rPr>
+              <a:t>3. The future of domestication</a:t>
             </a:r>
           </a:p>
         </p:txBody>

</xml_diff>